<commit_message>
matrix world and fig size
</commit_message>
<xml_diff>
--- a/MatrixWorld.pptx
+++ b/MatrixWorld.pptx
@@ -245,7 +245,7 @@
           <a:p>
             <a:fld id="{855F31C7-9260-9F43-86C6-63C2C1EE0131}" type="datetimeFigureOut">
               <a:rPr kumimoji="1" lang="ja-JP" altLang="en-US" smtClean="0"/>
-              <a:t>2022/9/22</a:t>
+              <a:t>2022/10/16</a:t>
             </a:fld>
             <a:endParaRPr kumimoji="1" lang="ja-JP" altLang="en-US"/>
           </a:p>
@@ -447,7 +447,7 @@
           <a:p>
             <a:fld id="{855F31C7-9260-9F43-86C6-63C2C1EE0131}" type="datetimeFigureOut">
               <a:rPr kumimoji="1" lang="ja-JP" altLang="en-US" smtClean="0"/>
-              <a:t>2022/9/22</a:t>
+              <a:t>2022/10/16</a:t>
             </a:fld>
             <a:endParaRPr kumimoji="1" lang="ja-JP" altLang="en-US"/>
           </a:p>
@@ -659,7 +659,7 @@
           <a:p>
             <a:fld id="{855F31C7-9260-9F43-86C6-63C2C1EE0131}" type="datetimeFigureOut">
               <a:rPr kumimoji="1" lang="ja-JP" altLang="en-US" smtClean="0"/>
-              <a:t>2022/9/22</a:t>
+              <a:t>2022/10/16</a:t>
             </a:fld>
             <a:endParaRPr kumimoji="1" lang="ja-JP" altLang="en-US"/>
           </a:p>
@@ -861,7 +861,7 @@
           <a:p>
             <a:fld id="{855F31C7-9260-9F43-86C6-63C2C1EE0131}" type="datetimeFigureOut">
               <a:rPr kumimoji="1" lang="ja-JP" altLang="en-US" smtClean="0"/>
-              <a:t>2022/9/22</a:t>
+              <a:t>2022/10/16</a:t>
             </a:fld>
             <a:endParaRPr kumimoji="1" lang="ja-JP" altLang="en-US"/>
           </a:p>
@@ -1107,7 +1107,7 @@
           <a:p>
             <a:fld id="{855F31C7-9260-9F43-86C6-63C2C1EE0131}" type="datetimeFigureOut">
               <a:rPr kumimoji="1" lang="ja-JP" altLang="en-US" smtClean="0"/>
-              <a:t>2022/9/22</a:t>
+              <a:t>2022/10/16</a:t>
             </a:fld>
             <a:endParaRPr kumimoji="1" lang="ja-JP" altLang="en-US"/>
           </a:p>
@@ -1403,7 +1403,7 @@
           <a:p>
             <a:fld id="{855F31C7-9260-9F43-86C6-63C2C1EE0131}" type="datetimeFigureOut">
               <a:rPr kumimoji="1" lang="ja-JP" altLang="en-US" smtClean="0"/>
-              <a:t>2022/9/22</a:t>
+              <a:t>2022/10/16</a:t>
             </a:fld>
             <a:endParaRPr kumimoji="1" lang="ja-JP" altLang="en-US"/>
           </a:p>
@@ -1834,7 +1834,7 @@
           <a:p>
             <a:fld id="{855F31C7-9260-9F43-86C6-63C2C1EE0131}" type="datetimeFigureOut">
               <a:rPr kumimoji="1" lang="ja-JP" altLang="en-US" smtClean="0"/>
-              <a:t>2022/9/22</a:t>
+              <a:t>2022/10/16</a:t>
             </a:fld>
             <a:endParaRPr kumimoji="1" lang="ja-JP" altLang="en-US"/>
           </a:p>
@@ -1952,7 +1952,7 @@
           <a:p>
             <a:fld id="{855F31C7-9260-9F43-86C6-63C2C1EE0131}" type="datetimeFigureOut">
               <a:rPr kumimoji="1" lang="ja-JP" altLang="en-US" smtClean="0"/>
-              <a:t>2022/9/22</a:t>
+              <a:t>2022/10/16</a:t>
             </a:fld>
             <a:endParaRPr kumimoji="1" lang="ja-JP" altLang="en-US"/>
           </a:p>
@@ -2047,7 +2047,7 @@
           <a:p>
             <a:fld id="{855F31C7-9260-9F43-86C6-63C2C1EE0131}" type="datetimeFigureOut">
               <a:rPr kumimoji="1" lang="ja-JP" altLang="en-US" smtClean="0"/>
-              <a:t>2022/9/22</a:t>
+              <a:t>2022/10/16</a:t>
             </a:fld>
             <a:endParaRPr kumimoji="1" lang="ja-JP" altLang="en-US"/>
           </a:p>
@@ -2356,7 +2356,7 @@
           <a:p>
             <a:fld id="{855F31C7-9260-9F43-86C6-63C2C1EE0131}" type="datetimeFigureOut">
               <a:rPr kumimoji="1" lang="ja-JP" altLang="en-US" smtClean="0"/>
-              <a:t>2022/9/22</a:t>
+              <a:t>2022/10/16</a:t>
             </a:fld>
             <a:endParaRPr kumimoji="1" lang="ja-JP" altLang="en-US"/>
           </a:p>
@@ -2613,7 +2613,7 @@
           <a:p>
             <a:fld id="{855F31C7-9260-9F43-86C6-63C2C1EE0131}" type="datetimeFigureOut">
               <a:rPr kumimoji="1" lang="ja-JP" altLang="en-US" smtClean="0"/>
-              <a:t>2022/9/22</a:t>
+              <a:t>2022/10/16</a:t>
             </a:fld>
             <a:endParaRPr kumimoji="1" lang="ja-JP" altLang="en-US"/>
           </a:p>
@@ -2858,7 +2858,7 @@
           <a:p>
             <a:fld id="{855F31C7-9260-9F43-86C6-63C2C1EE0131}" type="datetimeFigureOut">
               <a:rPr kumimoji="1" lang="ja-JP" altLang="en-US" smtClean="0"/>
-              <a:t>2022/9/22</a:t>
+              <a:t>2022/10/16</a:t>
             </a:fld>
             <a:endParaRPr kumimoji="1" lang="ja-JP" altLang="en-US"/>
           </a:p>
@@ -3824,7 +3824,7 @@
         <p:spPr>
           <a:xfrm>
             <a:off x="4026198" y="3243466"/>
-            <a:ext cx="2346803" cy="518209"/>
+            <a:ext cx="2346803" cy="561675"/>
           </a:xfrm>
           <a:prstGeom prst="roundRect">
             <a:avLst>
@@ -4573,8 +4573,8 @@
           </p:sp>
         </mc:Fallback>
       </mc:AlternateContent>
-      <mc:AlternateContent xmlns:mc="http://schemas.openxmlformats.org/markup-compatibility/2006">
-        <mc:Choice xmlns:a14="http://schemas.microsoft.com/office/drawing/2010/main" Requires="a14">
+      <mc:AlternateContent xmlns:mc="http://schemas.openxmlformats.org/markup-compatibility/2006" xmlns:a14="http://schemas.microsoft.com/office/drawing/2010/main">
+        <mc:Choice Requires="a14">
           <p:sp>
             <p:nvSpPr>
               <p:cNvPr id="17" name="テキスト ボックス 16">
@@ -4624,7 +4624,7 @@
             </p:txBody>
           </p:sp>
         </mc:Choice>
-        <mc:Fallback>
+        <mc:Fallback xmlns="">
           <p:sp>
             <p:nvSpPr>
               <p:cNvPr id="17" name="テキスト ボックス 16">
@@ -5180,8 +5180,8 @@
           </p:sp>
         </mc:Fallback>
       </mc:AlternateContent>
-      <mc:AlternateContent xmlns:mc="http://schemas.openxmlformats.org/markup-compatibility/2006">
-        <mc:Choice xmlns:a14="http://schemas.microsoft.com/office/drawing/2010/main" Requires="a14">
+      <mc:AlternateContent xmlns:mc="http://schemas.openxmlformats.org/markup-compatibility/2006" xmlns:a14="http://schemas.microsoft.com/office/drawing/2010/main">
+        <mc:Choice Requires="a14">
           <p:sp>
             <p:nvSpPr>
               <p:cNvPr id="25" name="テキスト ボックス 24">
@@ -5265,7 +5265,7 @@
             </p:txBody>
           </p:sp>
         </mc:Choice>
-        <mc:Fallback>
+        <mc:Fallback xmlns="">
           <p:sp>
             <p:nvSpPr>
               <p:cNvPr id="25" name="テキスト ボックス 24">
@@ -6269,8 +6269,8 @@
           </a:p>
         </p:txBody>
       </p:sp>
-      <mc:AlternateContent xmlns:mc="http://schemas.openxmlformats.org/markup-compatibility/2006">
-        <mc:Choice xmlns:a14="http://schemas.microsoft.com/office/drawing/2010/main" Requires="a14">
+      <mc:AlternateContent xmlns:mc="http://schemas.openxmlformats.org/markup-compatibility/2006" xmlns:a14="http://schemas.microsoft.com/office/drawing/2010/main">
+        <mc:Choice Requires="a14">
           <p:sp>
             <p:nvSpPr>
               <p:cNvPr id="37" name="テキスト ボックス 36">
@@ -6342,7 +6342,7 @@
             </p:txBody>
           </p:sp>
         </mc:Choice>
-        <mc:Fallback>
+        <mc:Fallback xmlns="">
           <p:sp>
             <p:nvSpPr>
               <p:cNvPr id="37" name="テキスト ボックス 36">
@@ -6776,8 +6776,8 @@
           </a:p>
         </p:txBody>
       </p:sp>
-      <mc:AlternateContent xmlns:mc="http://schemas.openxmlformats.org/markup-compatibility/2006">
-        <mc:Choice xmlns:a14="http://schemas.microsoft.com/office/drawing/2010/main" Requires="a14">
+      <mc:AlternateContent xmlns:mc="http://schemas.openxmlformats.org/markup-compatibility/2006" xmlns:a14="http://schemas.microsoft.com/office/drawing/2010/main">
+        <mc:Choice Requires="a14">
           <p:sp>
             <p:nvSpPr>
               <p:cNvPr id="49" name="テキスト ボックス 48">
@@ -6849,7 +6849,7 @@
             </p:txBody>
           </p:sp>
         </mc:Choice>
-        <mc:Fallback>
+        <mc:Fallback xmlns="">
           <p:sp>
             <p:nvSpPr>
               <p:cNvPr id="49" name="テキスト ボックス 48">
@@ -6974,8 +6974,8 @@
           </a:p>
         </p:txBody>
       </p:sp>
-      <mc:AlternateContent xmlns:mc="http://schemas.openxmlformats.org/markup-compatibility/2006">
-        <mc:Choice xmlns:a14="http://schemas.microsoft.com/office/drawing/2010/main" Requires="a14">
+      <mc:AlternateContent xmlns:mc="http://schemas.openxmlformats.org/markup-compatibility/2006" xmlns:a14="http://schemas.microsoft.com/office/drawing/2010/main">
+        <mc:Choice Requires="a14">
           <p:sp>
             <p:nvSpPr>
               <p:cNvPr id="57" name="テキスト ボックス 56">
@@ -7050,7 +7050,7 @@
             </p:txBody>
           </p:sp>
         </mc:Choice>
-        <mc:Fallback>
+        <mc:Fallback xmlns="">
           <p:sp>
             <p:nvSpPr>
               <p:cNvPr id="57" name="テキスト ボックス 56">
@@ -7095,8 +7095,8 @@
           </p:sp>
         </mc:Fallback>
       </mc:AlternateContent>
-      <mc:AlternateContent xmlns:mc="http://schemas.openxmlformats.org/markup-compatibility/2006">
-        <mc:Choice xmlns:a14="http://schemas.microsoft.com/office/drawing/2010/main" Requires="a14">
+      <mc:AlternateContent xmlns:mc="http://schemas.openxmlformats.org/markup-compatibility/2006" xmlns:a14="http://schemas.microsoft.com/office/drawing/2010/main">
+        <mc:Choice Requires="a14">
           <p:sp>
             <p:nvSpPr>
               <p:cNvPr id="58" name="テキスト ボックス 57">
@@ -7230,7 +7230,7 @@
             </p:txBody>
           </p:sp>
         </mc:Choice>
-        <mc:Fallback>
+        <mc:Fallback xmlns="">
           <p:sp>
             <p:nvSpPr>
               <p:cNvPr id="58" name="テキスト ボックス 57">
@@ -7275,8 +7275,8 @@
           </p:sp>
         </mc:Fallback>
       </mc:AlternateContent>
-      <mc:AlternateContent xmlns:mc="http://schemas.openxmlformats.org/markup-compatibility/2006">
-        <mc:Choice xmlns:a14="http://schemas.microsoft.com/office/drawing/2010/main" Requires="a14">
+      <mc:AlternateContent xmlns:mc="http://schemas.openxmlformats.org/markup-compatibility/2006" xmlns:a14="http://schemas.microsoft.com/office/drawing/2010/main">
+        <mc:Choice Requires="a14">
           <p:sp>
             <p:nvSpPr>
               <p:cNvPr id="61" name="テキスト ボックス 60">
@@ -7342,7 +7342,7 @@
             </p:txBody>
           </p:sp>
         </mc:Choice>
-        <mc:Fallback>
+        <mc:Fallback xmlns="">
           <p:sp>
             <p:nvSpPr>
               <p:cNvPr id="61" name="テキスト ボックス 60">
@@ -7387,8 +7387,8 @@
           </p:sp>
         </mc:Fallback>
       </mc:AlternateContent>
-      <mc:AlternateContent xmlns:mc="http://schemas.openxmlformats.org/markup-compatibility/2006">
-        <mc:Choice xmlns:a14="http://schemas.microsoft.com/office/drawing/2010/main" Requires="a14">
+      <mc:AlternateContent xmlns:mc="http://schemas.openxmlformats.org/markup-compatibility/2006" xmlns:a14="http://schemas.microsoft.com/office/drawing/2010/main">
+        <mc:Choice Requires="a14">
           <p:sp>
             <p:nvSpPr>
               <p:cNvPr id="62" name="テキスト ボックス 61">
@@ -7500,7 +7500,7 @@
             </p:txBody>
           </p:sp>
         </mc:Choice>
-        <mc:Fallback>
+        <mc:Fallback xmlns="">
           <p:sp>
             <p:nvSpPr>
               <p:cNvPr id="62" name="テキスト ボックス 61">
@@ -7587,8 +7587,8 @@
           </a:fontRef>
         </p:style>
       </p:cxnSp>
-      <mc:AlternateContent xmlns:mc="http://schemas.openxmlformats.org/markup-compatibility/2006">
-        <mc:Choice xmlns:a14="http://schemas.microsoft.com/office/drawing/2010/main" Requires="a14">
+      <mc:AlternateContent xmlns:mc="http://schemas.openxmlformats.org/markup-compatibility/2006" xmlns:a14="http://schemas.microsoft.com/office/drawing/2010/main">
+        <mc:Choice Requires="a14">
           <p:sp>
             <p:nvSpPr>
               <p:cNvPr id="63" name="テキスト ボックス 62">
@@ -7729,7 +7729,7 @@
             </p:txBody>
           </p:sp>
         </mc:Choice>
-        <mc:Fallback>
+        <mc:Fallback xmlns="">
           <p:sp>
             <p:nvSpPr>
               <p:cNvPr id="63" name="テキスト ボックス 62">
@@ -7790,7 +7790,7 @@
         </p:nvCxnSpPr>
         <p:spPr>
           <a:xfrm>
-            <a:off x="3996127" y="3810314"/>
+            <a:off x="3996127" y="3836192"/>
             <a:ext cx="309661" cy="0"/>
           </a:xfrm>
           <a:prstGeom prst="straightConnector1">
@@ -7816,8 +7816,8 @@
           </a:fontRef>
         </p:style>
       </p:cxnSp>
-      <mc:AlternateContent xmlns:mc="http://schemas.openxmlformats.org/markup-compatibility/2006">
-        <mc:Choice xmlns:a14="http://schemas.microsoft.com/office/drawing/2010/main" Requires="a14">
+      <mc:AlternateContent xmlns:mc="http://schemas.openxmlformats.org/markup-compatibility/2006" xmlns:a14="http://schemas.microsoft.com/office/drawing/2010/main">
+        <mc:Choice Requires="a14">
           <p:sp>
             <p:nvSpPr>
               <p:cNvPr id="69" name="テキスト ボックス 68">
@@ -7931,7 +7931,7 @@
             </p:txBody>
           </p:sp>
         </mc:Choice>
-        <mc:Fallback>
+        <mc:Fallback xmlns="">
           <p:sp>
             <p:nvSpPr>
               <p:cNvPr id="69" name="テキスト ボックス 68">
@@ -8021,8 +8021,8 @@
           </a:p>
         </p:txBody>
       </p:sp>
-      <mc:AlternateContent xmlns:mc="http://schemas.openxmlformats.org/markup-compatibility/2006">
-        <mc:Choice xmlns:a14="http://schemas.microsoft.com/office/drawing/2010/main" Requires="a14">
+      <mc:AlternateContent xmlns:mc="http://schemas.openxmlformats.org/markup-compatibility/2006" xmlns:a14="http://schemas.microsoft.com/office/drawing/2010/main">
+        <mc:Choice Requires="a14">
           <p:sp>
             <p:nvSpPr>
               <p:cNvPr id="73" name="テキスト ボックス 72">
@@ -8097,7 +8097,7 @@
             </p:txBody>
           </p:sp>
         </mc:Choice>
-        <mc:Fallback>
+        <mc:Fallback xmlns="">
           <p:sp>
             <p:nvSpPr>
               <p:cNvPr id="73" name="テキスト ボックス 72">
@@ -8179,8 +8179,8 @@
           </a:p>
         </p:txBody>
       </p:sp>
-      <mc:AlternateContent xmlns:mc="http://schemas.openxmlformats.org/markup-compatibility/2006">
-        <mc:Choice xmlns:a14="http://schemas.microsoft.com/office/drawing/2010/main" Requires="a14">
+      <mc:AlternateContent xmlns:mc="http://schemas.openxmlformats.org/markup-compatibility/2006" xmlns:a14="http://schemas.microsoft.com/office/drawing/2010/main">
+        <mc:Choice Requires="a14">
           <p:sp>
             <p:nvSpPr>
               <p:cNvPr id="77" name="テキスト ボックス 76">
@@ -8285,7 +8285,7 @@
             </p:txBody>
           </p:sp>
         </mc:Choice>
-        <mc:Fallback>
+        <mc:Fallback xmlns="">
           <p:sp>
             <p:nvSpPr>
               <p:cNvPr id="77" name="テキスト ボックス 76">
@@ -8823,8 +8823,8 @@
           </p:sp>
         </mc:Fallback>
       </mc:AlternateContent>
-      <mc:AlternateContent xmlns:mc="http://schemas.openxmlformats.org/markup-compatibility/2006">
-        <mc:Choice xmlns:a14="http://schemas.microsoft.com/office/drawing/2010/main" Requires="a14">
+      <mc:AlternateContent xmlns:mc="http://schemas.openxmlformats.org/markup-compatibility/2006" xmlns:a14="http://schemas.microsoft.com/office/drawing/2010/main">
+        <mc:Choice Requires="a14">
           <p:sp>
             <p:nvSpPr>
               <p:cNvPr id="76" name="テキスト ボックス 75">
@@ -8853,6 +8853,7 @@
               </a:bodyPr>
               <a:lstStyle/>
               <a:p>
+                <a:pPr/>
                 <a14:m>
                   <m:oMathPara xmlns:m="http://schemas.openxmlformats.org/officeDocument/2006/math">
                     <m:oMathParaPr>
@@ -8972,7 +8973,7 @@
             </p:txBody>
           </p:sp>
         </mc:Choice>
-        <mc:Fallback>
+        <mc:Fallback xmlns="">
           <p:sp>
             <p:nvSpPr>
               <p:cNvPr id="76" name="テキスト ボックス 75">
@@ -9537,8 +9538,8 @@
           </a:fontRef>
         </p:style>
       </p:cxnSp>
-      <mc:AlternateContent xmlns:mc="http://schemas.openxmlformats.org/markup-compatibility/2006">
-        <mc:Choice xmlns:a14="http://schemas.microsoft.com/office/drawing/2010/main" Requires="a14">
+      <mc:AlternateContent xmlns:mc="http://schemas.openxmlformats.org/markup-compatibility/2006" xmlns:a14="http://schemas.microsoft.com/office/drawing/2010/main">
+        <mc:Choice Requires="a14">
           <p:sp>
             <p:nvSpPr>
               <p:cNvPr id="110" name="テキスト ボックス 109">
@@ -9631,7 +9632,7 @@
             </p:txBody>
           </p:sp>
         </mc:Choice>
-        <mc:Fallback>
+        <mc:Fallback xmlns="">
           <p:sp>
             <p:nvSpPr>
               <p:cNvPr id="110" name="テキスト ボックス 109">
@@ -9676,8 +9677,8 @@
           </p:sp>
         </mc:Fallback>
       </mc:AlternateContent>
-      <mc:AlternateContent xmlns:mc="http://schemas.openxmlformats.org/markup-compatibility/2006">
-        <mc:Choice xmlns:a14="http://schemas.microsoft.com/office/drawing/2010/main" Requires="a14">
+      <mc:AlternateContent xmlns:mc="http://schemas.openxmlformats.org/markup-compatibility/2006" xmlns:a14="http://schemas.microsoft.com/office/drawing/2010/main">
+        <mc:Choice Requires="a14">
           <p:sp>
             <p:nvSpPr>
               <p:cNvPr id="111" name="テキスト ボックス 110">
@@ -9775,7 +9776,7 @@
             </p:txBody>
           </p:sp>
         </mc:Choice>
-        <mc:Fallback>
+        <mc:Fallback xmlns="">
           <p:sp>
             <p:nvSpPr>
               <p:cNvPr id="111" name="テキスト ボックス 110">
@@ -12081,13 +12082,13 @@
                 <a:latin typeface="Times New Roman" panose="02020603050405020304" pitchFamily="18" charset="0"/>
                 <a:cs typeface="Times New Roman" panose="02020603050405020304" pitchFamily="18" charset="0"/>
               </a:rPr>
-              <a:t>(v1.4.5, Spet.22,2022)</a:t>
+              <a:t>(v1.4.6, Oct.16,2022)</a:t>
             </a:r>
           </a:p>
         </p:txBody>
       </p:sp>
-      <mc:AlternateContent xmlns:mc="http://schemas.openxmlformats.org/markup-compatibility/2006">
-        <mc:Choice xmlns:a14="http://schemas.microsoft.com/office/drawing/2010/main" Requires="a14">
+      <mc:AlternateContent xmlns:mc="http://schemas.openxmlformats.org/markup-compatibility/2006" xmlns:a14="http://schemas.microsoft.com/office/drawing/2010/main">
+        <mc:Choice Requires="a14">
           <p:sp>
             <p:nvSpPr>
               <p:cNvPr id="74" name="テキスト ボックス 73">
@@ -12140,7 +12141,7 @@
             </p:txBody>
           </p:sp>
         </mc:Choice>
-        <mc:Fallback>
+        <mc:Fallback xmlns="">
           <p:sp>
             <p:nvSpPr>
               <p:cNvPr id="74" name="テキスト ボックス 73">
@@ -12201,7 +12202,7 @@
             </p:nvSpPr>
             <p:spPr>
               <a:xfrm>
-                <a:off x="5152829" y="3497828"/>
+                <a:off x="5624713" y="3522644"/>
                 <a:ext cx="576295" cy="221792"/>
               </a:xfrm>
               <a:prstGeom prst="rect">
@@ -12337,7 +12338,7 @@
             </p:nvSpPr>
             <p:spPr>
               <a:xfrm>
-                <a:off x="5152829" y="3497828"/>
+                <a:off x="5624713" y="3522644"/>
                 <a:ext cx="576295" cy="221792"/>
               </a:xfrm>
               <a:prstGeom prst="rect">
@@ -12346,7 +12347,7 @@
               <a:blipFill>
                 <a:blip r:embed="rId51"/>
                 <a:stretch>
-                  <a:fillRect b="-16667"/>
+                  <a:fillRect l="-2174" b="-16667"/>
                 </a:stretch>
               </a:blipFill>
             </p:spPr>
@@ -12381,7 +12382,7 @@
             </p:nvSpPr>
             <p:spPr>
               <a:xfrm>
-                <a:off x="5607561" y="3339634"/>
+                <a:off x="4768567" y="3529243"/>
                 <a:ext cx="801864" cy="227948"/>
               </a:xfrm>
               <a:prstGeom prst="rect">
@@ -12553,7 +12554,7 @@
             </p:nvSpPr>
             <p:spPr>
               <a:xfrm>
-                <a:off x="5607561" y="3339634"/>
+                <a:off x="4768567" y="3529243"/>
                 <a:ext cx="801864" cy="227948"/>
               </a:xfrm>
               <a:prstGeom prst="rect">
@@ -12562,7 +12563,7 @@
               <a:blipFill>
                 <a:blip r:embed="rId52"/>
                 <a:stretch>
-                  <a:fillRect b="-16667"/>
+                  <a:fillRect b="-15789"/>
                 </a:stretch>
               </a:blipFill>
             </p:spPr>
@@ -13645,8 +13646,8 @@
           </a:p>
         </p:txBody>
       </p:sp>
-      <mc:AlternateContent xmlns:mc="http://schemas.openxmlformats.org/markup-compatibility/2006">
-        <mc:Choice xmlns:a14="http://schemas.microsoft.com/office/drawing/2010/main" Requires="a14">
+      <mc:AlternateContent xmlns:mc="http://schemas.openxmlformats.org/markup-compatibility/2006" xmlns:a14="http://schemas.microsoft.com/office/drawing/2010/main">
+        <mc:Choice Requires="a14">
           <p:sp>
             <p:nvSpPr>
               <p:cNvPr id="20" name="テキスト ボックス 19">
@@ -13749,7 +13750,7 @@
             </p:txBody>
           </p:sp>
         </mc:Choice>
-        <mc:Fallback>
+        <mc:Fallback xmlns="">
           <p:sp>
             <p:nvSpPr>
               <p:cNvPr id="20" name="テキスト ボックス 19">
@@ -13794,8 +13795,8 @@
           </p:sp>
         </mc:Fallback>
       </mc:AlternateContent>
-      <mc:AlternateContent xmlns:mc="http://schemas.openxmlformats.org/markup-compatibility/2006">
-        <mc:Choice xmlns:a14="http://schemas.microsoft.com/office/drawing/2010/main" Requires="a14">
+      <mc:AlternateContent xmlns:mc="http://schemas.openxmlformats.org/markup-compatibility/2006" xmlns:a14="http://schemas.microsoft.com/office/drawing/2010/main">
+        <mc:Choice Requires="a14">
           <p:sp>
             <p:nvSpPr>
               <p:cNvPr id="21" name="テキスト ボックス 20">
@@ -13860,7 +13861,7 @@
             </p:txBody>
           </p:sp>
         </mc:Choice>
-        <mc:Fallback>
+        <mc:Fallback xmlns="">
           <p:sp>
             <p:nvSpPr>
               <p:cNvPr id="21" name="テキスト ボックス 20">
@@ -13905,8 +13906,8 @@
           </p:sp>
         </mc:Fallback>
       </mc:AlternateContent>
-      <mc:AlternateContent xmlns:mc="http://schemas.openxmlformats.org/markup-compatibility/2006">
-        <mc:Choice xmlns:a14="http://schemas.microsoft.com/office/drawing/2010/main" Requires="a14">
+      <mc:AlternateContent xmlns:mc="http://schemas.openxmlformats.org/markup-compatibility/2006" xmlns:a14="http://schemas.microsoft.com/office/drawing/2010/main">
+        <mc:Choice Requires="a14">
           <p:sp>
             <p:nvSpPr>
               <p:cNvPr id="25" name="テキスト ボックス 24">
@@ -13971,7 +13972,7 @@
             </p:txBody>
           </p:sp>
         </mc:Choice>
-        <mc:Fallback>
+        <mc:Fallback xmlns="">
           <p:sp>
             <p:nvSpPr>
               <p:cNvPr id="25" name="テキスト ボックス 24">
@@ -14016,8 +14017,8 @@
           </p:sp>
         </mc:Fallback>
       </mc:AlternateContent>
-      <mc:AlternateContent xmlns:mc="http://schemas.openxmlformats.org/markup-compatibility/2006">
-        <mc:Choice xmlns:a14="http://schemas.microsoft.com/office/drawing/2010/main" Requires="a14">
+      <mc:AlternateContent xmlns:mc="http://schemas.openxmlformats.org/markup-compatibility/2006" xmlns:a14="http://schemas.microsoft.com/office/drawing/2010/main">
+        <mc:Choice Requires="a14">
           <p:sp>
             <p:nvSpPr>
               <p:cNvPr id="26" name="テキスト ボックス 25">
@@ -14135,7 +14136,7 @@
             </p:txBody>
           </p:sp>
         </mc:Choice>
-        <mc:Fallback>
+        <mc:Fallback xmlns="">
           <p:sp>
             <p:nvSpPr>
               <p:cNvPr id="26" name="テキスト ボックス 25">
@@ -14180,8 +14181,8 @@
           </p:sp>
         </mc:Fallback>
       </mc:AlternateContent>
-      <mc:AlternateContent xmlns:mc="http://schemas.openxmlformats.org/markup-compatibility/2006">
-        <mc:Choice xmlns:a14="http://schemas.microsoft.com/office/drawing/2010/main" Requires="a14">
+      <mc:AlternateContent xmlns:mc="http://schemas.openxmlformats.org/markup-compatibility/2006" xmlns:a14="http://schemas.microsoft.com/office/drawing/2010/main">
+        <mc:Choice Requires="a14">
           <p:sp>
             <p:nvSpPr>
               <p:cNvPr id="27" name="テキスト ボックス 26">
@@ -14293,7 +14294,7 @@
             </p:txBody>
           </p:sp>
         </mc:Choice>
-        <mc:Fallback>
+        <mc:Fallback xmlns="">
           <p:sp>
             <p:nvSpPr>
               <p:cNvPr id="27" name="テキスト ボックス 26">
@@ -15147,8 +15148,8 @@
           </a:p>
         </p:txBody>
       </p:sp>
-      <mc:AlternateContent xmlns:mc="http://schemas.openxmlformats.org/markup-compatibility/2006">
-        <mc:Choice xmlns:a14="http://schemas.microsoft.com/office/drawing/2010/main" Requires="a14">
+      <mc:AlternateContent xmlns:mc="http://schemas.openxmlformats.org/markup-compatibility/2006" xmlns:a14="http://schemas.microsoft.com/office/drawing/2010/main">
+        <mc:Choice Requires="a14">
           <p:sp>
             <p:nvSpPr>
               <p:cNvPr id="49" name="テキスト ボックス 48">
@@ -15237,7 +15238,7 @@
             </p:txBody>
           </p:sp>
         </mc:Choice>
-        <mc:Fallback>
+        <mc:Fallback xmlns="">
           <p:sp>
             <p:nvSpPr>
               <p:cNvPr id="49" name="テキスト ボックス 48">
@@ -15356,8 +15357,8 @@
           </a:p>
         </p:txBody>
       </p:sp>
-      <mc:AlternateContent xmlns:mc="http://schemas.openxmlformats.org/markup-compatibility/2006">
-        <mc:Choice xmlns:a14="http://schemas.microsoft.com/office/drawing/2010/main" Requires="a14">
+      <mc:AlternateContent xmlns:mc="http://schemas.openxmlformats.org/markup-compatibility/2006" xmlns:a14="http://schemas.microsoft.com/office/drawing/2010/main">
+        <mc:Choice Requires="a14">
           <p:sp>
             <p:nvSpPr>
               <p:cNvPr id="57" name="テキスト ボックス 56">
@@ -15432,7 +15433,7 @@
             </p:txBody>
           </p:sp>
         </mc:Choice>
-        <mc:Fallback>
+        <mc:Fallback xmlns="">
           <p:sp>
             <p:nvSpPr>
               <p:cNvPr id="57" name="テキスト ボックス 56">
@@ -15477,8 +15478,8 @@
           </p:sp>
         </mc:Fallback>
       </mc:AlternateContent>
-      <mc:AlternateContent xmlns:mc="http://schemas.openxmlformats.org/markup-compatibility/2006">
-        <mc:Choice xmlns:a14="http://schemas.microsoft.com/office/drawing/2010/main" Requires="a14">
+      <mc:AlternateContent xmlns:mc="http://schemas.openxmlformats.org/markup-compatibility/2006" xmlns:a14="http://schemas.microsoft.com/office/drawing/2010/main">
+        <mc:Choice Requires="a14">
           <p:sp>
             <p:nvSpPr>
               <p:cNvPr id="61" name="テキスト ボックス 60">
@@ -15544,7 +15545,7 @@
             </p:txBody>
           </p:sp>
         </mc:Choice>
-        <mc:Fallback>
+        <mc:Fallback xmlns="">
           <p:sp>
             <p:nvSpPr>
               <p:cNvPr id="61" name="テキスト ボックス 60">
@@ -15589,8 +15590,8 @@
           </p:sp>
         </mc:Fallback>
       </mc:AlternateContent>
-      <mc:AlternateContent xmlns:mc="http://schemas.openxmlformats.org/markup-compatibility/2006">
-        <mc:Choice xmlns:a14="http://schemas.microsoft.com/office/drawing/2010/main" Requires="a14">
+      <mc:AlternateContent xmlns:mc="http://schemas.openxmlformats.org/markup-compatibility/2006" xmlns:a14="http://schemas.microsoft.com/office/drawing/2010/main">
+        <mc:Choice Requires="a14">
           <p:sp>
             <p:nvSpPr>
               <p:cNvPr id="62" name="テキスト ボックス 61">
@@ -15702,7 +15703,7 @@
             </p:txBody>
           </p:sp>
         </mc:Choice>
-        <mc:Fallback>
+        <mc:Fallback xmlns="">
           <p:sp>
             <p:nvSpPr>
               <p:cNvPr id="62" name="テキスト ボックス 61">
@@ -15789,8 +15790,8 @@
           </a:fontRef>
         </p:style>
       </p:cxnSp>
-      <mc:AlternateContent xmlns:mc="http://schemas.openxmlformats.org/markup-compatibility/2006">
-        <mc:Choice xmlns:a14="http://schemas.microsoft.com/office/drawing/2010/main" Requires="a14">
+      <mc:AlternateContent xmlns:mc="http://schemas.openxmlformats.org/markup-compatibility/2006" xmlns:a14="http://schemas.microsoft.com/office/drawing/2010/main">
+        <mc:Choice Requires="a14">
           <p:sp>
             <p:nvSpPr>
               <p:cNvPr id="63" name="テキスト ボックス 62">
@@ -15931,7 +15932,7 @@
             </p:txBody>
           </p:sp>
         </mc:Choice>
-        <mc:Fallback>
+        <mc:Fallback xmlns="">
           <p:sp>
             <p:nvSpPr>
               <p:cNvPr id="63" name="テキスト ボックス 62">
@@ -16018,8 +16019,8 @@
           </a:fontRef>
         </p:style>
       </p:cxnSp>
-      <mc:AlternateContent xmlns:mc="http://schemas.openxmlformats.org/markup-compatibility/2006">
-        <mc:Choice xmlns:a14="http://schemas.microsoft.com/office/drawing/2010/main" Requires="a14">
+      <mc:AlternateContent xmlns:mc="http://schemas.openxmlformats.org/markup-compatibility/2006" xmlns:a14="http://schemas.microsoft.com/office/drawing/2010/main">
+        <mc:Choice Requires="a14">
           <p:sp>
             <p:nvSpPr>
               <p:cNvPr id="68" name="テキスト ボックス 67">
@@ -16113,7 +16114,7 @@
             </p:txBody>
           </p:sp>
         </mc:Choice>
-        <mc:Fallback>
+        <mc:Fallback xmlns="">
           <p:sp>
             <p:nvSpPr>
               <p:cNvPr id="68" name="テキスト ボックス 67">
@@ -16158,8 +16159,8 @@
           </p:sp>
         </mc:Fallback>
       </mc:AlternateContent>
-      <mc:AlternateContent xmlns:mc="http://schemas.openxmlformats.org/markup-compatibility/2006">
-        <mc:Choice xmlns:a14="http://schemas.microsoft.com/office/drawing/2010/main" Requires="a14">
+      <mc:AlternateContent xmlns:mc="http://schemas.openxmlformats.org/markup-compatibility/2006" xmlns:a14="http://schemas.microsoft.com/office/drawing/2010/main">
+        <mc:Choice Requires="a14">
           <p:sp>
             <p:nvSpPr>
               <p:cNvPr id="69" name="テキスト ボックス 68">
@@ -16271,7 +16272,7 @@
             </p:txBody>
           </p:sp>
         </mc:Choice>
-        <mc:Fallback>
+        <mc:Fallback xmlns="">
           <p:sp>
             <p:nvSpPr>
               <p:cNvPr id="69" name="テキスト ボックス 68">
@@ -16363,8 +16364,8 @@
           </a:p>
         </p:txBody>
       </p:sp>
-      <mc:AlternateContent xmlns:mc="http://schemas.openxmlformats.org/markup-compatibility/2006">
-        <mc:Choice xmlns:a14="http://schemas.microsoft.com/office/drawing/2010/main" Requires="a14">
+      <mc:AlternateContent xmlns:mc="http://schemas.openxmlformats.org/markup-compatibility/2006" xmlns:a14="http://schemas.microsoft.com/office/drawing/2010/main">
+        <mc:Choice Requires="a14">
           <p:sp>
             <p:nvSpPr>
               <p:cNvPr id="73" name="テキスト ボックス 72">
@@ -16439,7 +16440,7 @@
             </p:txBody>
           </p:sp>
         </mc:Choice>
-        <mc:Fallback>
+        <mc:Fallback xmlns="">
           <p:sp>
             <p:nvSpPr>
               <p:cNvPr id="73" name="テキスト ボックス 72">
@@ -16484,8 +16485,8 @@
           </p:sp>
         </mc:Fallback>
       </mc:AlternateContent>
-      <mc:AlternateContent xmlns:mc="http://schemas.openxmlformats.org/markup-compatibility/2006">
-        <mc:Choice xmlns:a14="http://schemas.microsoft.com/office/drawing/2010/main" Requires="a14">
+      <mc:AlternateContent xmlns:mc="http://schemas.openxmlformats.org/markup-compatibility/2006" xmlns:a14="http://schemas.microsoft.com/office/drawing/2010/main">
+        <mc:Choice Requires="a14">
           <p:sp>
             <p:nvSpPr>
               <p:cNvPr id="77" name="テキスト ボックス 76">
@@ -16550,7 +16551,7 @@
             </p:txBody>
           </p:sp>
         </mc:Choice>
-        <mc:Fallback>
+        <mc:Fallback xmlns="">
           <p:sp>
             <p:nvSpPr>
               <p:cNvPr id="77" name="テキスト ボックス 76">
@@ -17508,8 +17509,8 @@
           </a:fontRef>
         </p:style>
       </p:cxnSp>
-      <mc:AlternateContent xmlns:mc="http://schemas.openxmlformats.org/markup-compatibility/2006">
-        <mc:Choice xmlns:a14="http://schemas.microsoft.com/office/drawing/2010/main" Requires="a14">
+      <mc:AlternateContent xmlns:mc="http://schemas.openxmlformats.org/markup-compatibility/2006" xmlns:a14="http://schemas.microsoft.com/office/drawing/2010/main">
+        <mc:Choice Requires="a14">
           <p:sp>
             <p:nvSpPr>
               <p:cNvPr id="110" name="テキスト ボックス 109">
@@ -17605,7 +17606,7 @@
             </p:txBody>
           </p:sp>
         </mc:Choice>
-        <mc:Fallback>
+        <mc:Fallback xmlns="">
           <p:sp>
             <p:nvSpPr>
               <p:cNvPr id="110" name="テキスト ボックス 109">
@@ -17650,8 +17651,8 @@
           </p:sp>
         </mc:Fallback>
       </mc:AlternateContent>
-      <mc:AlternateContent xmlns:mc="http://schemas.openxmlformats.org/markup-compatibility/2006">
-        <mc:Choice xmlns:a14="http://schemas.microsoft.com/office/drawing/2010/main" Requires="a14">
+      <mc:AlternateContent xmlns:mc="http://schemas.openxmlformats.org/markup-compatibility/2006" xmlns:a14="http://schemas.microsoft.com/office/drawing/2010/main">
+        <mc:Choice Requires="a14">
           <p:sp>
             <p:nvSpPr>
               <p:cNvPr id="111" name="テキスト ボックス 110">
@@ -17743,7 +17744,7 @@
             </p:txBody>
           </p:sp>
         </mc:Choice>
-        <mc:Fallback>
+        <mc:Fallback xmlns="">
           <p:sp>
             <p:nvSpPr>
               <p:cNvPr id="111" name="テキスト ボックス 110">
@@ -18253,7 +18254,7 @@
                 <a:latin typeface="Times New Roman" panose="02020603050405020304" pitchFamily="18" charset="0"/>
                 <a:cs typeface="Times New Roman" panose="02020603050405020304" pitchFamily="18" charset="0"/>
               </a:rPr>
-              <a:t>(v1.4.5, Spet.22,2022)</a:t>
+              <a:t>(v1.4.6, Oct.16,2022)</a:t>
             </a:r>
           </a:p>
         </p:txBody>
@@ -18357,8 +18358,8 @@
           </a:p>
         </p:txBody>
       </p:sp>
-      <mc:AlternateContent xmlns:mc="http://schemas.openxmlformats.org/markup-compatibility/2006">
-        <mc:Choice xmlns:a14="http://schemas.microsoft.com/office/drawing/2010/main" Requires="a14">
+      <mc:AlternateContent xmlns:mc="http://schemas.openxmlformats.org/markup-compatibility/2006" xmlns:a14="http://schemas.microsoft.com/office/drawing/2010/main">
+        <mc:Choice Requires="a14">
           <p:sp>
             <p:nvSpPr>
               <p:cNvPr id="94" name="テキスト ボックス 93">
@@ -18457,7 +18458,7 @@
             </p:txBody>
           </p:sp>
         </mc:Choice>
-        <mc:Fallback>
+        <mc:Fallback xmlns="">
           <p:sp>
             <p:nvSpPr>
               <p:cNvPr id="94" name="テキスト ボックス 93">
@@ -19958,8 +19959,8 @@
           </a:p>
         </p:txBody>
       </p:sp>
-      <mc:AlternateContent xmlns:mc="http://schemas.openxmlformats.org/markup-compatibility/2006">
-        <mc:Choice xmlns:a14="http://schemas.microsoft.com/office/drawing/2010/main" Requires="a14">
+      <mc:AlternateContent xmlns:mc="http://schemas.openxmlformats.org/markup-compatibility/2006" xmlns:a14="http://schemas.microsoft.com/office/drawing/2010/main">
+        <mc:Choice Requires="a14">
           <p:sp>
             <p:nvSpPr>
               <p:cNvPr id="76" name="テキスト ボックス 75">
@@ -20106,7 +20107,7 @@
             </p:txBody>
           </p:sp>
         </mc:Choice>
-        <mc:Fallback>
+        <mc:Fallback xmlns="">
           <p:sp>
             <p:nvSpPr>
               <p:cNvPr id="76" name="テキスト ボックス 75">
@@ -20241,8 +20242,8 @@
           </a:p>
         </p:txBody>
       </p:sp>
-      <mc:AlternateContent xmlns:mc="http://schemas.openxmlformats.org/markup-compatibility/2006">
-        <mc:Choice xmlns:a14="http://schemas.microsoft.com/office/drawing/2010/main" Requires="a14">
+      <mc:AlternateContent xmlns:mc="http://schemas.openxmlformats.org/markup-compatibility/2006" xmlns:a14="http://schemas.microsoft.com/office/drawing/2010/main">
+        <mc:Choice Requires="a14">
           <p:sp>
             <p:nvSpPr>
               <p:cNvPr id="37" name="テキスト ボックス 36">
@@ -20331,7 +20332,7 @@
             </p:txBody>
           </p:sp>
         </mc:Choice>
-        <mc:Fallback>
+        <mc:Fallback xmlns="">
           <p:sp>
             <p:nvSpPr>
               <p:cNvPr id="37" name="テキスト ボックス 36">
@@ -20376,8 +20377,8 @@
           </p:sp>
         </mc:Fallback>
       </mc:AlternateContent>
-      <mc:AlternateContent xmlns:mc="http://schemas.openxmlformats.org/markup-compatibility/2006">
-        <mc:Choice xmlns:a14="http://schemas.microsoft.com/office/drawing/2010/main" Requires="a14">
+      <mc:AlternateContent xmlns:mc="http://schemas.openxmlformats.org/markup-compatibility/2006" xmlns:a14="http://schemas.microsoft.com/office/drawing/2010/main">
+        <mc:Choice Requires="a14">
           <p:sp>
             <p:nvSpPr>
               <p:cNvPr id="7" name="テキスト ボックス 6">
@@ -20427,7 +20428,7 @@
             </p:txBody>
           </p:sp>
         </mc:Choice>
-        <mc:Fallback>
+        <mc:Fallback xmlns="">
           <p:sp>
             <p:nvSpPr>
               <p:cNvPr id="7" name="テキスト ボックス 6">
@@ -20531,8 +20532,8 @@
         </p:nvSpPr>
         <p:spPr>
           <a:xfrm>
-            <a:off x="4026198" y="3243467"/>
-            <a:ext cx="2421471" cy="519434"/>
+            <a:off x="4026198" y="3243466"/>
+            <a:ext cx="2421471" cy="548761"/>
           </a:xfrm>
           <a:prstGeom prst="roundRect">
             <a:avLst>
@@ -20566,8 +20567,8 @@
           </a:p>
         </p:txBody>
       </p:sp>
-      <mc:AlternateContent xmlns:mc="http://schemas.openxmlformats.org/markup-compatibility/2006">
-        <mc:Choice xmlns:a14="http://schemas.microsoft.com/office/drawing/2010/main" Requires="a14">
+      <mc:AlternateContent xmlns:mc="http://schemas.openxmlformats.org/markup-compatibility/2006" xmlns:a14="http://schemas.microsoft.com/office/drawing/2010/main">
+        <mc:Choice Requires="a14">
           <p:sp>
             <p:nvSpPr>
               <p:cNvPr id="74" name="テキスト ボックス 73">
@@ -20620,7 +20621,7 @@
             </p:txBody>
           </p:sp>
         </mc:Choice>
-        <mc:Fallback>
+        <mc:Fallback xmlns="">
           <p:sp>
             <p:nvSpPr>
               <p:cNvPr id="74" name="テキスト ボックス 73">
@@ -20714,8 +20715,8 @@
           </a:p>
         </p:txBody>
       </p:sp>
-      <mc:AlternateContent xmlns:mc="http://schemas.openxmlformats.org/markup-compatibility/2006">
-        <mc:Choice xmlns:a14="http://schemas.microsoft.com/office/drawing/2010/main" Requires="a14">
+      <mc:AlternateContent xmlns:mc="http://schemas.openxmlformats.org/markup-compatibility/2006" xmlns:a14="http://schemas.microsoft.com/office/drawing/2010/main">
+        <mc:Choice Requires="a14">
           <p:sp>
             <p:nvSpPr>
               <p:cNvPr id="24" name="テキスト ボックス 23">
@@ -20829,7 +20830,7 @@
             </p:txBody>
           </p:sp>
         </mc:Choice>
-        <mc:Fallback>
+        <mc:Fallback xmlns="">
           <p:sp>
             <p:nvSpPr>
               <p:cNvPr id="24" name="テキスト ボックス 23">
@@ -20942,7 +20943,7 @@
             </p:nvSpPr>
             <p:spPr>
               <a:xfrm>
-                <a:off x="5152829" y="3497828"/>
+                <a:off x="5610588" y="3540630"/>
                 <a:ext cx="576295" cy="221792"/>
               </a:xfrm>
               <a:prstGeom prst="rect">
@@ -21078,7 +21079,7 @@
             </p:nvSpPr>
             <p:spPr>
               <a:xfrm>
-                <a:off x="5152829" y="3497828"/>
+                <a:off x="5610588" y="3540630"/>
                 <a:ext cx="576295" cy="221792"/>
               </a:xfrm>
               <a:prstGeom prst="rect">
@@ -21087,7 +21088,7 @@
               <a:blipFill>
                 <a:blip r:embed="rId57"/>
                 <a:stretch>
-                  <a:fillRect b="-16667"/>
+                  <a:fillRect b="-10526"/>
                 </a:stretch>
               </a:blipFill>
             </p:spPr>
@@ -21122,7 +21123,7 @@
             </p:nvSpPr>
             <p:spPr>
               <a:xfrm>
-                <a:off x="5607561" y="3339634"/>
+                <a:off x="4761233" y="3545712"/>
                 <a:ext cx="801864" cy="227948"/>
               </a:xfrm>
               <a:prstGeom prst="rect">
@@ -21294,7 +21295,7 @@
             </p:nvSpPr>
             <p:spPr>
               <a:xfrm>
-                <a:off x="5607561" y="3339634"/>
+                <a:off x="4761233" y="3545712"/>
                 <a:ext cx="801864" cy="227948"/>
               </a:xfrm>
               <a:prstGeom prst="rect">
@@ -21303,7 +21304,7 @@
               <a:blipFill>
                 <a:blip r:embed="rId58"/>
                 <a:stretch>
-                  <a:fillRect b="-16667"/>
+                  <a:fillRect b="-10526"/>
                 </a:stretch>
               </a:blipFill>
             </p:spPr>

</xml_diff>

<commit_message>
matrix world typos thanks Calvin(clvnkhr)
</commit_message>
<xml_diff>
--- a/MatrixWorld.pptx
+++ b/MatrixWorld.pptx
@@ -245,7 +245,7 @@
           <a:p>
             <a:fld id="{855F31C7-9260-9F43-86C6-63C2C1EE0131}" type="datetimeFigureOut">
               <a:rPr kumimoji="1" lang="ja-JP" altLang="en-US" smtClean="0"/>
-              <a:t>2022/10/16</a:t>
+              <a:t>2022/10/25</a:t>
             </a:fld>
             <a:endParaRPr kumimoji="1" lang="ja-JP" altLang="en-US"/>
           </a:p>
@@ -447,7 +447,7 @@
           <a:p>
             <a:fld id="{855F31C7-9260-9F43-86C6-63C2C1EE0131}" type="datetimeFigureOut">
               <a:rPr kumimoji="1" lang="ja-JP" altLang="en-US" smtClean="0"/>
-              <a:t>2022/10/16</a:t>
+              <a:t>2022/10/25</a:t>
             </a:fld>
             <a:endParaRPr kumimoji="1" lang="ja-JP" altLang="en-US"/>
           </a:p>
@@ -659,7 +659,7 @@
           <a:p>
             <a:fld id="{855F31C7-9260-9F43-86C6-63C2C1EE0131}" type="datetimeFigureOut">
               <a:rPr kumimoji="1" lang="ja-JP" altLang="en-US" smtClean="0"/>
-              <a:t>2022/10/16</a:t>
+              <a:t>2022/10/25</a:t>
             </a:fld>
             <a:endParaRPr kumimoji="1" lang="ja-JP" altLang="en-US"/>
           </a:p>
@@ -861,7 +861,7 @@
           <a:p>
             <a:fld id="{855F31C7-9260-9F43-86C6-63C2C1EE0131}" type="datetimeFigureOut">
               <a:rPr kumimoji="1" lang="ja-JP" altLang="en-US" smtClean="0"/>
-              <a:t>2022/10/16</a:t>
+              <a:t>2022/10/25</a:t>
             </a:fld>
             <a:endParaRPr kumimoji="1" lang="ja-JP" altLang="en-US"/>
           </a:p>
@@ -1107,7 +1107,7 @@
           <a:p>
             <a:fld id="{855F31C7-9260-9F43-86C6-63C2C1EE0131}" type="datetimeFigureOut">
               <a:rPr kumimoji="1" lang="ja-JP" altLang="en-US" smtClean="0"/>
-              <a:t>2022/10/16</a:t>
+              <a:t>2022/10/25</a:t>
             </a:fld>
             <a:endParaRPr kumimoji="1" lang="ja-JP" altLang="en-US"/>
           </a:p>
@@ -1403,7 +1403,7 @@
           <a:p>
             <a:fld id="{855F31C7-9260-9F43-86C6-63C2C1EE0131}" type="datetimeFigureOut">
               <a:rPr kumimoji="1" lang="ja-JP" altLang="en-US" smtClean="0"/>
-              <a:t>2022/10/16</a:t>
+              <a:t>2022/10/25</a:t>
             </a:fld>
             <a:endParaRPr kumimoji="1" lang="ja-JP" altLang="en-US"/>
           </a:p>
@@ -1834,7 +1834,7 @@
           <a:p>
             <a:fld id="{855F31C7-9260-9F43-86C6-63C2C1EE0131}" type="datetimeFigureOut">
               <a:rPr kumimoji="1" lang="ja-JP" altLang="en-US" smtClean="0"/>
-              <a:t>2022/10/16</a:t>
+              <a:t>2022/10/25</a:t>
             </a:fld>
             <a:endParaRPr kumimoji="1" lang="ja-JP" altLang="en-US"/>
           </a:p>
@@ -1952,7 +1952,7 @@
           <a:p>
             <a:fld id="{855F31C7-9260-9F43-86C6-63C2C1EE0131}" type="datetimeFigureOut">
               <a:rPr kumimoji="1" lang="ja-JP" altLang="en-US" smtClean="0"/>
-              <a:t>2022/10/16</a:t>
+              <a:t>2022/10/25</a:t>
             </a:fld>
             <a:endParaRPr kumimoji="1" lang="ja-JP" altLang="en-US"/>
           </a:p>
@@ -2047,7 +2047,7 @@
           <a:p>
             <a:fld id="{855F31C7-9260-9F43-86C6-63C2C1EE0131}" type="datetimeFigureOut">
               <a:rPr kumimoji="1" lang="ja-JP" altLang="en-US" smtClean="0"/>
-              <a:t>2022/10/16</a:t>
+              <a:t>2022/10/25</a:t>
             </a:fld>
             <a:endParaRPr kumimoji="1" lang="ja-JP" altLang="en-US"/>
           </a:p>
@@ -2356,7 +2356,7 @@
           <a:p>
             <a:fld id="{855F31C7-9260-9F43-86C6-63C2C1EE0131}" type="datetimeFigureOut">
               <a:rPr kumimoji="1" lang="ja-JP" altLang="en-US" smtClean="0"/>
-              <a:t>2022/10/16</a:t>
+              <a:t>2022/10/25</a:t>
             </a:fld>
             <a:endParaRPr kumimoji="1" lang="ja-JP" altLang="en-US"/>
           </a:p>
@@ -2613,7 +2613,7 @@
           <a:p>
             <a:fld id="{855F31C7-9260-9F43-86C6-63C2C1EE0131}" type="datetimeFigureOut">
               <a:rPr kumimoji="1" lang="ja-JP" altLang="en-US" smtClean="0"/>
-              <a:t>2022/10/16</a:t>
+              <a:t>2022/10/25</a:t>
             </a:fld>
             <a:endParaRPr kumimoji="1" lang="ja-JP" altLang="en-US"/>
           </a:p>
@@ -2858,7 +2858,7 @@
           <a:p>
             <a:fld id="{855F31C7-9260-9F43-86C6-63C2C1EE0131}" type="datetimeFigureOut">
               <a:rPr kumimoji="1" lang="ja-JP" altLang="en-US" smtClean="0"/>
-              <a:t>2022/10/16</a:t>
+              <a:t>2022/10/25</a:t>
             </a:fld>
             <a:endParaRPr kumimoji="1" lang="ja-JP" altLang="en-US"/>
           </a:p>
@@ -5310,8 +5310,8 @@
           </p:sp>
         </mc:Fallback>
       </mc:AlternateContent>
-      <mc:AlternateContent xmlns:mc="http://schemas.openxmlformats.org/markup-compatibility/2006" xmlns:a14="http://schemas.microsoft.com/office/drawing/2010/main">
-        <mc:Choice Requires="a14">
+      <mc:AlternateContent xmlns:mc="http://schemas.openxmlformats.org/markup-compatibility/2006">
+        <mc:Choice xmlns:a14="http://schemas.microsoft.com/office/drawing/2010/main" Requires="a14">
           <p:sp>
             <p:nvSpPr>
               <p:cNvPr id="26" name="テキスト ボックス 25">
@@ -5326,7 +5326,7 @@
             </p:nvSpPr>
             <p:spPr>
               <a:xfrm>
-                <a:off x="2361965" y="2297179"/>
+                <a:off x="2292957" y="2297179"/>
                 <a:ext cx="1574784" cy="256224"/>
               </a:xfrm>
               <a:prstGeom prst="rect">
@@ -5434,7 +5434,7 @@
                         <a:rPr lang="en-US" altLang="ja-JP" sz="825" b="0" i="1">
                           <a:latin typeface="Cambria Math" panose="02040503050406030204" pitchFamily="18" charset="0"/>
                         </a:rPr>
-                        <m:t>𝑑𝑖𝑎𝑔𝑜𝑛𝑖𝑧𝑎𝑏𝑙𝑒</m:t>
+                        <m:t>𝑑𝑖𝑎𝑔𝑜𝑛𝑎𝑙𝑖𝑧𝑎𝑏𝑙𝑒</m:t>
                       </m:r>
                       <m:r>
                         <a:rPr lang="en-US" altLang="ja-JP" sz="825" b="0" i="1">
@@ -5480,7 +5480,7 @@
             </p:txBody>
           </p:sp>
         </mc:Choice>
-        <mc:Fallback xmlns="">
+        <mc:Fallback>
           <p:sp>
             <p:nvSpPr>
               <p:cNvPr id="26" name="テキスト ボックス 25">
@@ -5497,7 +5497,7 @@
             </p:nvSpPr>
             <p:spPr>
               <a:xfrm>
-                <a:off x="2361965" y="2297179"/>
+                <a:off x="2292957" y="2297179"/>
                 <a:ext cx="1574784" cy="256224"/>
               </a:xfrm>
               <a:prstGeom prst="rect">
@@ -5506,7 +5506,7 @@
               <a:blipFill>
                 <a:blip r:embed="rId9"/>
                 <a:stretch>
-                  <a:fillRect l="-3175" r="-7937" b="-13636"/>
+                  <a:fillRect l="-3200" r="-14400" b="-13636"/>
                 </a:stretch>
               </a:blipFill>
             </p:spPr>
@@ -7790,7 +7790,7 @@
         </p:nvCxnSpPr>
         <p:spPr>
           <a:xfrm>
-            <a:off x="3996127" y="3836192"/>
+            <a:off x="3996127" y="3818940"/>
             <a:ext cx="309661" cy="0"/>
           </a:xfrm>
           <a:prstGeom prst="straightConnector1">
@@ -10430,8 +10430,8 @@
           </a:p>
         </p:txBody>
       </p:sp>
-      <mc:AlternateContent xmlns:mc="http://schemas.openxmlformats.org/markup-compatibility/2006" xmlns:a14="http://schemas.microsoft.com/office/drawing/2010/main">
-        <mc:Choice Requires="a14">
+      <mc:AlternateContent xmlns:mc="http://schemas.openxmlformats.org/markup-compatibility/2006">
+        <mc:Choice xmlns:a14="http://schemas.microsoft.com/office/drawing/2010/main" Requires="a14">
           <p:sp>
             <p:nvSpPr>
               <p:cNvPr id="98" name="テキスト ボックス 97">
@@ -10472,7 +10472,7 @@
                           <a:latin typeface="Cambria Math" panose="02040503050406030204" pitchFamily="18" charset="0"/>
                           <a:ea typeface="Cambria Math" panose="02040503050406030204" pitchFamily="18" charset="0"/>
                         </a:rPr>
-                        <m:t>𝑝𝑒𝑟𝑚𝑢𝑡𝑎𝑖𝑜𝑛</m:t>
+                        <m:t>𝑝𝑒𝑟𝑚𝑢𝑡𝑎𝑡𝑖𝑜𝑛</m:t>
                       </m:r>
                       <m:r>
                         <a:rPr lang="en-US" altLang="ja-JP" sz="825" b="0" i="1" smtClean="0">
@@ -10609,7 +10609,7 @@
             </p:txBody>
           </p:sp>
         </mc:Choice>
-        <mc:Fallback xmlns="">
+        <mc:Fallback>
           <p:sp>
             <p:nvSpPr>
               <p:cNvPr id="98" name="テキスト ボックス 97">
@@ -12082,7 +12082,7 @@
                 <a:latin typeface="Times New Roman" panose="02020603050405020304" pitchFamily="18" charset="0"/>
                 <a:cs typeface="Times New Roman" panose="02020603050405020304" pitchFamily="18" charset="0"/>
               </a:rPr>
-              <a:t>(v1.4.6, Oct.16,2022)</a:t>
+              <a:t>(v1.4.7, Oct.25,2022)</a:t>
             </a:r>
           </a:p>
         </p:txBody>
@@ -12186,8 +12186,8 @@
           </p:sp>
         </mc:Fallback>
       </mc:AlternateContent>
-      <mc:AlternateContent xmlns:mc="http://schemas.openxmlformats.org/markup-compatibility/2006">
-        <mc:Choice xmlns:a14="http://schemas.microsoft.com/office/drawing/2010/main" Requires="a14">
+      <mc:AlternateContent xmlns:mc="http://schemas.openxmlformats.org/markup-compatibility/2006" xmlns:a14="http://schemas.microsoft.com/office/drawing/2010/main">
+        <mc:Choice Requires="a14">
           <p:sp>
             <p:nvSpPr>
               <p:cNvPr id="43" name="テキスト ボックス 42">
@@ -12321,7 +12321,7 @@
             </p:txBody>
           </p:sp>
         </mc:Choice>
-        <mc:Fallback>
+        <mc:Fallback xmlns="">
           <p:sp>
             <p:nvSpPr>
               <p:cNvPr id="43" name="テキスト ボックス 42">
@@ -12366,8 +12366,8 @@
           </p:sp>
         </mc:Fallback>
       </mc:AlternateContent>
-      <mc:AlternateContent xmlns:mc="http://schemas.openxmlformats.org/markup-compatibility/2006">
-        <mc:Choice xmlns:a14="http://schemas.microsoft.com/office/drawing/2010/main" Requires="a14">
+      <mc:AlternateContent xmlns:mc="http://schemas.openxmlformats.org/markup-compatibility/2006" xmlns:a14="http://schemas.microsoft.com/office/drawing/2010/main">
+        <mc:Choice Requires="a14">
           <p:sp>
             <p:nvSpPr>
               <p:cNvPr id="44" name="テキスト ボックス 43">
@@ -12537,7 +12537,7 @@
             </p:txBody>
           </p:sp>
         </mc:Choice>
-        <mc:Fallback>
+        <mc:Fallback xmlns="">
           <p:sp>
             <p:nvSpPr>
               <p:cNvPr id="44" name="テキスト ボックス 43">
@@ -20927,8 +20927,8 @@
           </a:p>
         </p:txBody>
       </p:sp>
-      <mc:AlternateContent xmlns:mc="http://schemas.openxmlformats.org/markup-compatibility/2006">
-        <mc:Choice xmlns:a14="http://schemas.microsoft.com/office/drawing/2010/main" Requires="a14">
+      <mc:AlternateContent xmlns:mc="http://schemas.openxmlformats.org/markup-compatibility/2006" xmlns:a14="http://schemas.microsoft.com/office/drawing/2010/main">
+        <mc:Choice Requires="a14">
           <p:sp>
             <p:nvSpPr>
               <p:cNvPr id="45" name="テキスト ボックス 44">
@@ -21062,7 +21062,7 @@
             </p:txBody>
           </p:sp>
         </mc:Choice>
-        <mc:Fallback>
+        <mc:Fallback xmlns="">
           <p:sp>
             <p:nvSpPr>
               <p:cNvPr id="45" name="テキスト ボックス 44">
@@ -21107,8 +21107,8 @@
           </p:sp>
         </mc:Fallback>
       </mc:AlternateContent>
-      <mc:AlternateContent xmlns:mc="http://schemas.openxmlformats.org/markup-compatibility/2006">
-        <mc:Choice xmlns:a14="http://schemas.microsoft.com/office/drawing/2010/main" Requires="a14">
+      <mc:AlternateContent xmlns:mc="http://schemas.openxmlformats.org/markup-compatibility/2006" xmlns:a14="http://schemas.microsoft.com/office/drawing/2010/main">
+        <mc:Choice Requires="a14">
           <p:sp>
             <p:nvSpPr>
               <p:cNvPr id="46" name="テキスト ボックス 45">
@@ -21278,7 +21278,7 @@
             </p:txBody>
           </p:sp>
         </mc:Choice>
-        <mc:Fallback>
+        <mc:Fallback xmlns="">
           <p:sp>
             <p:nvSpPr>
               <p:cNvPr id="46" name="テキスト ボックス 45">

</xml_diff>